<commit_message>
Updates to the deck (Now you can see how last minute I am with my decks) :)
</commit_message>
<xml_diff>
--- a/Advanced Test Driven Development.pptx
+++ b/Advanced Test Driven Development.pptx
@@ -15,13 +15,18 @@
     <p:sldId id="261" r:id="rId9"/>
     <p:sldId id="265" r:id="rId10"/>
     <p:sldId id="264" r:id="rId11"/>
-    <p:sldId id="266" r:id="rId12"/>
-    <p:sldId id="267" r:id="rId13"/>
-    <p:sldId id="268" r:id="rId14"/>
-    <p:sldId id="269" r:id="rId15"/>
-    <p:sldId id="270" r:id="rId16"/>
-    <p:sldId id="271" r:id="rId17"/>
-    <p:sldId id="272" r:id="rId18"/>
+    <p:sldId id="277" r:id="rId12"/>
+    <p:sldId id="273" r:id="rId13"/>
+    <p:sldId id="276" r:id="rId14"/>
+    <p:sldId id="274" r:id="rId15"/>
+    <p:sldId id="275" r:id="rId16"/>
+    <p:sldId id="266" r:id="rId17"/>
+    <p:sldId id="267" r:id="rId18"/>
+    <p:sldId id="268" r:id="rId19"/>
+    <p:sldId id="269" r:id="rId20"/>
+    <p:sldId id="270" r:id="rId21"/>
+    <p:sldId id="271" r:id="rId22"/>
+    <p:sldId id="272" r:id="rId23"/>
   </p:sldIdLst>
   <p:sldSz cx="9144000" cy="6858000" type="screen4x3"/>
   <p:notesSz cx="6858000" cy="9144000"/>
@@ -14053,10 +14058,679 @@
   <p:clrMapOvr>
     <a:masterClrMapping/>
   </p:clrMapOvr>
+  <mc:AlternateContent xmlns:mc="http://schemas.openxmlformats.org/markup-compatibility/2006">
+    <mc:Choice xmlns:p14="http://schemas.microsoft.com/office/powerpoint/2010/main" Requires="p14">
+      <p:transition spd="med" p14:dur="700">
+        <p:fade/>
+      </p:transition>
+    </mc:Choice>
+    <mc:Fallback>
+      <p:transition spd="med">
+        <p:fade/>
+      </p:transition>
+    </mc:Fallback>
+  </mc:AlternateContent>
+  <p:timing>
+    <p:tnLst>
+      <p:par>
+        <p:cTn id="1" dur="indefinite" restart="never" nodeType="tmRoot"/>
+      </p:par>
+    </p:tnLst>
+  </p:timing>
 </p:sld>
 </file>
 
 <file path=ppt/slides/slide11.xml><?xml version="1.0" encoding="utf-8"?>
+<p:sld xmlns:a="http://schemas.openxmlformats.org/drawingml/2006/main" xmlns:r="http://schemas.openxmlformats.org/officeDocument/2006/relationships" xmlns:p="http://schemas.openxmlformats.org/presentationml/2006/main">
+  <p:cSld>
+    <p:spTree>
+      <p:nvGrpSpPr>
+        <p:cNvPr id="1" name=""/>
+        <p:cNvGrpSpPr/>
+        <p:nvPr/>
+      </p:nvGrpSpPr>
+      <p:grpSpPr>
+        <a:xfrm>
+          <a:off x="0" y="0"/>
+          <a:ext cx="0" cy="0"/>
+          <a:chOff x="0" y="0"/>
+          <a:chExt cx="0" cy="0"/>
+        </a:xfrm>
+      </p:grpSpPr>
+      <p:sp>
+        <p:nvSpPr>
+          <p:cNvPr id="2" name="Title 1"/>
+          <p:cNvSpPr>
+            <a:spLocks noGrp="1"/>
+          </p:cNvSpPr>
+          <p:nvPr>
+            <p:ph type="title"/>
+          </p:nvPr>
+        </p:nvSpPr>
+        <p:spPr/>
+        <p:txBody>
+          <a:bodyPr>
+            <a:normAutofit fontScale="90000"/>
+          </a:bodyPr>
+          <a:lstStyle/>
+          <a:p>
+            <a:r>
+              <a:rPr lang="en-US" dirty="0" smtClean="0"/>
+              <a:t>Tim! Where did you get your coding super powers from?</a:t>
+            </a:r>
+            <a:endParaRPr lang="en-US" dirty="0"/>
+          </a:p>
+        </p:txBody>
+      </p:sp>
+    </p:spTree>
+    <p:extLst>
+      <p:ext uri="{BB962C8B-B14F-4D97-AF65-F5344CB8AC3E}">
+        <p14:creationId xmlns:p14="http://schemas.microsoft.com/office/powerpoint/2010/main" val="2554692259"/>
+      </p:ext>
+    </p:extLst>
+  </p:cSld>
+  <p:clrMapOvr>
+    <a:masterClrMapping/>
+  </p:clrMapOvr>
+  <mc:AlternateContent xmlns:mc="http://schemas.openxmlformats.org/markup-compatibility/2006">
+    <mc:Choice xmlns:p14="http://schemas.microsoft.com/office/powerpoint/2010/main" Requires="p14">
+      <p:transition spd="med" p14:dur="700">
+        <p:fade/>
+      </p:transition>
+    </mc:Choice>
+    <mc:Fallback>
+      <p:transition spd="med">
+        <p:fade/>
+      </p:transition>
+    </mc:Fallback>
+  </mc:AlternateContent>
+  <p:timing>
+    <p:tnLst>
+      <p:par>
+        <p:cTn id="1" dur="indefinite" restart="never" nodeType="tmRoot"/>
+      </p:par>
+    </p:tnLst>
+  </p:timing>
+</p:sld>
+</file>
+
+<file path=ppt/slides/slide12.xml><?xml version="1.0" encoding="utf-8"?>
+<p:sld xmlns:a="http://schemas.openxmlformats.org/drawingml/2006/main" xmlns:r="http://schemas.openxmlformats.org/officeDocument/2006/relationships" xmlns:p="http://schemas.openxmlformats.org/presentationml/2006/main">
+  <p:cSld>
+    <p:spTree>
+      <p:nvGrpSpPr>
+        <p:cNvPr id="1" name=""/>
+        <p:cNvGrpSpPr/>
+        <p:nvPr/>
+      </p:nvGrpSpPr>
+      <p:grpSpPr>
+        <a:xfrm>
+          <a:off x="0" y="0"/>
+          <a:ext cx="0" cy="0"/>
+          <a:chOff x="0" y="0"/>
+          <a:chExt cx="0" cy="0"/>
+        </a:xfrm>
+      </p:grpSpPr>
+      <p:sp>
+        <p:nvSpPr>
+          <p:cNvPr id="2" name="Title 1"/>
+          <p:cNvSpPr>
+            <a:spLocks noGrp="1"/>
+          </p:cNvSpPr>
+          <p:nvPr>
+            <p:ph type="title"/>
+          </p:nvPr>
+        </p:nvSpPr>
+        <p:spPr/>
+        <p:txBody>
+          <a:bodyPr>
+            <a:normAutofit fontScale="90000"/>
+          </a:bodyPr>
+          <a:lstStyle/>
+          <a:p>
+            <a:r>
+              <a:rPr lang="en-US" dirty="0" smtClean="0"/>
+              <a:t>Tim! Where did you get your coding super powers from?</a:t>
+            </a:r>
+            <a:endParaRPr lang="en-US" dirty="0"/>
+          </a:p>
+        </p:txBody>
+      </p:sp>
+      <p:pic>
+        <p:nvPicPr>
+          <p:cNvPr id="5" name="Picture 4"/>
+          <p:cNvPicPr>
+            <a:picLocks noChangeAspect="1"/>
+          </p:cNvPicPr>
+          <p:nvPr/>
+        </p:nvPicPr>
+        <p:blipFill>
+          <a:blip r:embed="rId2">
+            <a:extLst>
+              <a:ext uri="{28A0092B-C50C-407E-A947-70E740481C1C}">
+                <a14:useLocalDpi xmlns:a14="http://schemas.microsoft.com/office/drawing/2010/main" val="0"/>
+              </a:ext>
+            </a:extLst>
+          </a:blip>
+          <a:stretch>
+            <a:fillRect/>
+          </a:stretch>
+        </p:blipFill>
+        <p:spPr>
+          <a:xfrm>
+            <a:off x="3348498" y="2286000"/>
+            <a:ext cx="2447004" cy="2567101"/>
+          </a:xfrm>
+          <a:prstGeom prst="rect">
+            <a:avLst/>
+          </a:prstGeom>
+        </p:spPr>
+      </p:pic>
+    </p:spTree>
+    <p:extLst>
+      <p:ext uri="{BB962C8B-B14F-4D97-AF65-F5344CB8AC3E}">
+        <p14:creationId xmlns:p14="http://schemas.microsoft.com/office/powerpoint/2010/main" val="3262325135"/>
+      </p:ext>
+    </p:extLst>
+  </p:cSld>
+  <p:clrMapOvr>
+    <a:masterClrMapping/>
+  </p:clrMapOvr>
+  <mc:AlternateContent xmlns:mc="http://schemas.openxmlformats.org/markup-compatibility/2006">
+    <mc:Choice xmlns:p14="http://schemas.microsoft.com/office/powerpoint/2010/main" Requires="p14">
+      <p:transition spd="med" p14:dur="700">
+        <p:fade/>
+      </p:transition>
+    </mc:Choice>
+    <mc:Fallback>
+      <p:transition spd="med">
+        <p:fade/>
+      </p:transition>
+    </mc:Fallback>
+  </mc:AlternateContent>
+  <p:timing>
+    <p:tnLst>
+      <p:par>
+        <p:cTn id="1" dur="indefinite" restart="never" nodeType="tmRoot"/>
+      </p:par>
+    </p:tnLst>
+  </p:timing>
+</p:sld>
+</file>
+
+<file path=ppt/slides/slide13.xml><?xml version="1.0" encoding="utf-8"?>
+<p:sld xmlns:a="http://schemas.openxmlformats.org/drawingml/2006/main" xmlns:r="http://schemas.openxmlformats.org/officeDocument/2006/relationships" xmlns:p="http://schemas.openxmlformats.org/presentationml/2006/main">
+  <p:cSld>
+    <p:spTree>
+      <p:nvGrpSpPr>
+        <p:cNvPr id="1" name=""/>
+        <p:cNvGrpSpPr/>
+        <p:nvPr/>
+      </p:nvGrpSpPr>
+      <p:grpSpPr>
+        <a:xfrm>
+          <a:off x="0" y="0"/>
+          <a:ext cx="0" cy="0"/>
+          <a:chOff x="0" y="0"/>
+          <a:chExt cx="0" cy="0"/>
+        </a:xfrm>
+      </p:grpSpPr>
+      <p:sp>
+        <p:nvSpPr>
+          <p:cNvPr id="2" name="Title 1"/>
+          <p:cNvSpPr>
+            <a:spLocks noGrp="1"/>
+          </p:cNvSpPr>
+          <p:nvPr>
+            <p:ph type="title"/>
+          </p:nvPr>
+        </p:nvSpPr>
+        <p:spPr/>
+        <p:txBody>
+          <a:bodyPr>
+            <a:normAutofit fontScale="90000"/>
+          </a:bodyPr>
+          <a:lstStyle/>
+          <a:p>
+            <a:r>
+              <a:rPr lang="en-US" dirty="0" smtClean="0"/>
+              <a:t>Tim! Where did you get your coding super powers from?</a:t>
+            </a:r>
+            <a:endParaRPr lang="en-US" dirty="0"/>
+          </a:p>
+        </p:txBody>
+      </p:sp>
+      <p:pic>
+        <p:nvPicPr>
+          <p:cNvPr id="5" name="Picture 4"/>
+          <p:cNvPicPr>
+            <a:picLocks noChangeAspect="1"/>
+          </p:cNvPicPr>
+          <p:nvPr/>
+        </p:nvPicPr>
+        <p:blipFill>
+          <a:blip r:embed="rId2">
+            <a:extLst>
+              <a:ext uri="{28A0092B-C50C-407E-A947-70E740481C1C}">
+                <a14:useLocalDpi xmlns:a14="http://schemas.microsoft.com/office/drawing/2010/main" val="0"/>
+              </a:ext>
+            </a:extLst>
+          </a:blip>
+          <a:stretch>
+            <a:fillRect/>
+          </a:stretch>
+        </p:blipFill>
+        <p:spPr>
+          <a:xfrm>
+            <a:off x="3348498" y="2286000"/>
+            <a:ext cx="2447004" cy="2567101"/>
+          </a:xfrm>
+          <a:prstGeom prst="rect">
+            <a:avLst/>
+          </a:prstGeom>
+        </p:spPr>
+      </p:pic>
+      <p:sp>
+        <p:nvSpPr>
+          <p:cNvPr id="39" name="TextBox 38"/>
+          <p:cNvSpPr txBox="1"/>
+          <p:nvPr/>
+        </p:nvSpPr>
+        <p:spPr>
+          <a:xfrm>
+            <a:off x="582438" y="5334000"/>
+            <a:ext cx="2998962" cy="646331"/>
+          </a:xfrm>
+          <a:prstGeom prst="rect">
+            <a:avLst/>
+          </a:prstGeom>
+          <a:noFill/>
+        </p:spPr>
+        <p:txBody>
+          <a:bodyPr wrap="square" rtlCol="0">
+            <a:spAutoFit/>
+          </a:bodyPr>
+          <a:lstStyle/>
+          <a:p>
+            <a:r>
+              <a:rPr lang="en-US" b="1" dirty="0" smtClean="0">
+                <a:solidFill>
+                  <a:schemeClr val="accent3">
+                    <a:lumMod val="50000"/>
+                  </a:schemeClr>
+                </a:solidFill>
+                <a:latin typeface="MV Boli" pitchFamily="2" charset="0"/>
+                <a:cs typeface="MV Boli" pitchFamily="2" charset="0"/>
+              </a:rPr>
+              <a:t>You doubt he’s a Guru?</a:t>
+            </a:r>
+          </a:p>
+          <a:p>
+            <a:r>
+              <a:rPr lang="en-US" b="1" dirty="0" smtClean="0">
+                <a:solidFill>
+                  <a:schemeClr val="accent3">
+                    <a:lumMod val="50000"/>
+                  </a:schemeClr>
+                </a:solidFill>
+                <a:latin typeface="MV Boli" pitchFamily="2" charset="0"/>
+                <a:cs typeface="MV Boli" pitchFamily="2" charset="0"/>
+              </a:rPr>
+              <a:t>Guru’s are always bald!</a:t>
+            </a:r>
+          </a:p>
+        </p:txBody>
+      </p:sp>
+      <p:sp>
+        <p:nvSpPr>
+          <p:cNvPr id="40" name="Bent Arrow 39"/>
+          <p:cNvSpPr/>
+          <p:nvPr/>
+        </p:nvSpPr>
+        <p:spPr>
+          <a:xfrm>
+            <a:off x="1295400" y="2286000"/>
+            <a:ext cx="1981200" cy="3048000"/>
+          </a:xfrm>
+          <a:prstGeom prst="bentArrow">
+            <a:avLst>
+              <a:gd name="adj1" fmla="val 13846"/>
+              <a:gd name="adj2" fmla="val 14808"/>
+              <a:gd name="adj3" fmla="val 39231"/>
+              <a:gd name="adj4" fmla="val 37212"/>
+            </a:avLst>
+          </a:prstGeom>
+        </p:spPr>
+        <p:style>
+          <a:lnRef idx="2">
+            <a:schemeClr val="accent1">
+              <a:shade val="50000"/>
+            </a:schemeClr>
+          </a:lnRef>
+          <a:fillRef idx="1">
+            <a:schemeClr val="accent1"/>
+          </a:fillRef>
+          <a:effectRef idx="0">
+            <a:schemeClr val="accent1"/>
+          </a:effectRef>
+          <a:fontRef idx="minor">
+            <a:schemeClr val="lt1"/>
+          </a:fontRef>
+        </p:style>
+        <p:txBody>
+          <a:bodyPr rtlCol="0" anchor="ctr"/>
+          <a:lstStyle/>
+          <a:p>
+            <a:pPr algn="ctr"/>
+            <a:endParaRPr lang="en-US">
+              <a:solidFill>
+                <a:schemeClr val="tx1"/>
+              </a:solidFill>
+            </a:endParaRPr>
+          </a:p>
+        </p:txBody>
+      </p:sp>
+    </p:spTree>
+    <p:extLst>
+      <p:ext uri="{BB962C8B-B14F-4D97-AF65-F5344CB8AC3E}">
+        <p14:creationId xmlns:p14="http://schemas.microsoft.com/office/powerpoint/2010/main" val="856390092"/>
+      </p:ext>
+    </p:extLst>
+  </p:cSld>
+  <p:clrMapOvr>
+    <a:masterClrMapping/>
+  </p:clrMapOvr>
+  <mc:AlternateContent xmlns:mc="http://schemas.openxmlformats.org/markup-compatibility/2006">
+    <mc:Choice xmlns:p14="http://schemas.microsoft.com/office/powerpoint/2010/main" Requires="p14">
+      <p:transition spd="med" p14:dur="700">
+        <p:fade/>
+      </p:transition>
+    </mc:Choice>
+    <mc:Fallback>
+      <p:transition spd="med">
+        <p:fade/>
+      </p:transition>
+    </mc:Fallback>
+  </mc:AlternateContent>
+  <p:timing>
+    <p:tnLst>
+      <p:par>
+        <p:cTn id="1" dur="indefinite" restart="never" nodeType="tmRoot"/>
+      </p:par>
+    </p:tnLst>
+  </p:timing>
+</p:sld>
+</file>
+
+<file path=ppt/slides/slide14.xml><?xml version="1.0" encoding="utf-8"?>
+<p:sld xmlns:a="http://schemas.openxmlformats.org/drawingml/2006/main" xmlns:r="http://schemas.openxmlformats.org/officeDocument/2006/relationships" xmlns:p="http://schemas.openxmlformats.org/presentationml/2006/main">
+  <p:cSld>
+    <p:spTree>
+      <p:nvGrpSpPr>
+        <p:cNvPr id="1" name=""/>
+        <p:cNvGrpSpPr/>
+        <p:nvPr/>
+      </p:nvGrpSpPr>
+      <p:grpSpPr>
+        <a:xfrm>
+          <a:off x="0" y="0"/>
+          <a:ext cx="0" cy="0"/>
+          <a:chOff x="0" y="0"/>
+          <a:chExt cx="0" cy="0"/>
+        </a:xfrm>
+      </p:grpSpPr>
+      <p:sp>
+        <p:nvSpPr>
+          <p:cNvPr id="2" name="Title 1"/>
+          <p:cNvSpPr>
+            <a:spLocks noGrp="1"/>
+          </p:cNvSpPr>
+          <p:nvPr>
+            <p:ph type="title"/>
+          </p:nvPr>
+        </p:nvSpPr>
+        <p:spPr/>
+        <p:txBody>
+          <a:bodyPr>
+            <a:normAutofit fontScale="90000"/>
+          </a:bodyPr>
+          <a:lstStyle/>
+          <a:p>
+            <a:r>
+              <a:rPr lang="en-US" dirty="0" smtClean="0"/>
+              <a:t>Tim! Where did you get your coding super powers from?</a:t>
+            </a:r>
+            <a:endParaRPr lang="en-US" dirty="0"/>
+          </a:p>
+        </p:txBody>
+      </p:sp>
+      <p:pic>
+        <p:nvPicPr>
+          <p:cNvPr id="4" name="Picture 3"/>
+          <p:cNvPicPr>
+            <a:picLocks noChangeAspect="1"/>
+          </p:cNvPicPr>
+          <p:nvPr/>
+        </p:nvPicPr>
+        <p:blipFill>
+          <a:blip r:embed="rId2">
+            <a:extLst>
+              <a:ext uri="{28A0092B-C50C-407E-A947-70E740481C1C}">
+                <a14:useLocalDpi xmlns:a14="http://schemas.microsoft.com/office/drawing/2010/main" val="0"/>
+              </a:ext>
+            </a:extLst>
+          </a:blip>
+          <a:stretch>
+            <a:fillRect/>
+          </a:stretch>
+        </p:blipFill>
+        <p:spPr>
+          <a:xfrm>
+            <a:off x="3348498" y="2286000"/>
+            <a:ext cx="2447004" cy="2567101"/>
+          </a:xfrm>
+          <a:prstGeom prst="rect">
+            <a:avLst/>
+          </a:prstGeom>
+        </p:spPr>
+      </p:pic>
+      <p:pic>
+        <p:nvPicPr>
+          <p:cNvPr id="3" name="Picture 2"/>
+          <p:cNvPicPr>
+            <a:picLocks noChangeAspect="1"/>
+          </p:cNvPicPr>
+          <p:nvPr/>
+        </p:nvPicPr>
+        <p:blipFill>
+          <a:blip r:embed="rId3">
+            <a:extLst>
+              <a:ext uri="{28A0092B-C50C-407E-A947-70E740481C1C}">
+                <a14:useLocalDpi xmlns:a14="http://schemas.microsoft.com/office/drawing/2010/main" val="0"/>
+              </a:ext>
+            </a:extLst>
+          </a:blip>
+          <a:stretch>
+            <a:fillRect/>
+          </a:stretch>
+        </p:blipFill>
+        <p:spPr>
+          <a:xfrm>
+            <a:off x="2633186" y="4942799"/>
+            <a:ext cx="3877628" cy="1263115"/>
+          </a:xfrm>
+          <a:prstGeom prst="rect">
+            <a:avLst/>
+          </a:prstGeom>
+        </p:spPr>
+      </p:pic>
+    </p:spTree>
+    <p:extLst>
+      <p:ext uri="{BB962C8B-B14F-4D97-AF65-F5344CB8AC3E}">
+        <p14:creationId xmlns:p14="http://schemas.microsoft.com/office/powerpoint/2010/main" val="3467972846"/>
+      </p:ext>
+    </p:extLst>
+  </p:cSld>
+  <p:clrMapOvr>
+    <a:masterClrMapping/>
+  </p:clrMapOvr>
+  <mc:AlternateContent xmlns:mc="http://schemas.openxmlformats.org/markup-compatibility/2006">
+    <mc:Choice xmlns:p14="http://schemas.microsoft.com/office/powerpoint/2010/main" Requires="p14">
+      <p:transition spd="med" p14:dur="700">
+        <p:fade/>
+      </p:transition>
+    </mc:Choice>
+    <mc:Fallback>
+      <p:transition spd="med">
+        <p:fade/>
+      </p:transition>
+    </mc:Fallback>
+  </mc:AlternateContent>
+  <p:timing>
+    <p:tnLst>
+      <p:par>
+        <p:cTn id="1" dur="indefinite" restart="never" nodeType="tmRoot"/>
+      </p:par>
+    </p:tnLst>
+  </p:timing>
+</p:sld>
+</file>
+
+<file path=ppt/slides/slide15.xml><?xml version="1.0" encoding="utf-8"?>
+<p:sld xmlns:a="http://schemas.openxmlformats.org/drawingml/2006/main" xmlns:r="http://schemas.openxmlformats.org/officeDocument/2006/relationships" xmlns:p="http://schemas.openxmlformats.org/presentationml/2006/main">
+  <p:cSld>
+    <p:spTree>
+      <p:nvGrpSpPr>
+        <p:cNvPr id="1" name=""/>
+        <p:cNvGrpSpPr/>
+        <p:nvPr/>
+      </p:nvGrpSpPr>
+      <p:grpSpPr>
+        <a:xfrm>
+          <a:off x="0" y="0"/>
+          <a:ext cx="0" cy="0"/>
+          <a:chOff x="0" y="0"/>
+          <a:chExt cx="0" cy="0"/>
+        </a:xfrm>
+      </p:grpSpPr>
+      <p:sp>
+        <p:nvSpPr>
+          <p:cNvPr id="2" name="Title 1"/>
+          <p:cNvSpPr>
+            <a:spLocks noGrp="1"/>
+          </p:cNvSpPr>
+          <p:nvPr>
+            <p:ph type="title"/>
+          </p:nvPr>
+        </p:nvSpPr>
+        <p:spPr/>
+        <p:txBody>
+          <a:bodyPr>
+            <a:normAutofit fontScale="90000"/>
+          </a:bodyPr>
+          <a:lstStyle/>
+          <a:p>
+            <a:r>
+              <a:rPr lang="en-US" dirty="0" smtClean="0"/>
+              <a:t>Tim! Where did you get your coding super powers from?</a:t>
+            </a:r>
+            <a:endParaRPr lang="en-US" dirty="0"/>
+          </a:p>
+        </p:txBody>
+      </p:sp>
+      <p:pic>
+        <p:nvPicPr>
+          <p:cNvPr id="5" name="Picture 4"/>
+          <p:cNvPicPr>
+            <a:picLocks noChangeAspect="1"/>
+          </p:cNvPicPr>
+          <p:nvPr/>
+        </p:nvPicPr>
+        <p:blipFill>
+          <a:blip r:embed="rId2">
+            <a:extLst>
+              <a:ext uri="{28A0092B-C50C-407E-A947-70E740481C1C}">
+                <a14:useLocalDpi xmlns:a14="http://schemas.microsoft.com/office/drawing/2010/main" val="0"/>
+              </a:ext>
+            </a:extLst>
+          </a:blip>
+          <a:stretch>
+            <a:fillRect/>
+          </a:stretch>
+        </p:blipFill>
+        <p:spPr>
+          <a:xfrm>
+            <a:off x="2633186" y="4942799"/>
+            <a:ext cx="3877628" cy="1263115"/>
+          </a:xfrm>
+          <a:prstGeom prst="rect">
+            <a:avLst/>
+          </a:prstGeom>
+        </p:spPr>
+      </p:pic>
+      <p:pic>
+        <p:nvPicPr>
+          <p:cNvPr id="3" name="Picture 2"/>
+          <p:cNvPicPr>
+            <a:picLocks noChangeAspect="1"/>
+          </p:cNvPicPr>
+          <p:nvPr/>
+        </p:nvPicPr>
+        <p:blipFill>
+          <a:blip r:embed="rId3">
+            <a:extLst>
+              <a:ext uri="{28A0092B-C50C-407E-A947-70E740481C1C}">
+                <a14:useLocalDpi xmlns:a14="http://schemas.microsoft.com/office/drawing/2010/main" val="0"/>
+              </a:ext>
+            </a:extLst>
+          </a:blip>
+          <a:stretch>
+            <a:fillRect/>
+          </a:stretch>
+        </p:blipFill>
+        <p:spPr>
+          <a:xfrm>
+            <a:off x="3274449" y="2286000"/>
+            <a:ext cx="2595102" cy="2595102"/>
+          </a:xfrm>
+          <a:prstGeom prst="rect">
+            <a:avLst/>
+          </a:prstGeom>
+        </p:spPr>
+      </p:pic>
+    </p:spTree>
+    <p:extLst>
+      <p:ext uri="{BB962C8B-B14F-4D97-AF65-F5344CB8AC3E}">
+        <p14:creationId xmlns:p14="http://schemas.microsoft.com/office/powerpoint/2010/main" val="3467972846"/>
+      </p:ext>
+    </p:extLst>
+  </p:cSld>
+  <p:clrMapOvr>
+    <a:masterClrMapping/>
+  </p:clrMapOvr>
+  <mc:AlternateContent xmlns:mc="http://schemas.openxmlformats.org/markup-compatibility/2006">
+    <mc:Choice xmlns:p14="http://schemas.microsoft.com/office/powerpoint/2010/main" Requires="p14">
+      <p:transition spd="med" p14:dur="700">
+        <p:fade/>
+      </p:transition>
+    </mc:Choice>
+    <mc:Fallback>
+      <p:transition spd="med">
+        <p:fade/>
+      </p:transition>
+    </mc:Fallback>
+  </mc:AlternateContent>
+  <p:timing>
+    <p:tnLst>
+      <p:par>
+        <p:cTn id="1" dur="indefinite" restart="never" nodeType="tmRoot"/>
+      </p:par>
+    </p:tnLst>
+  </p:timing>
+</p:sld>
+</file>
+
+<file path=ppt/slides/slide16.xml><?xml version="1.0" encoding="utf-8"?>
 <p:sld xmlns:a="http://schemas.openxmlformats.org/drawingml/2006/main" xmlns:r="http://schemas.openxmlformats.org/officeDocument/2006/relationships" xmlns:p="http://schemas.openxmlformats.org/presentationml/2006/main">
   <p:cSld>
     <p:spTree>
@@ -14168,10 +14842,29 @@
   <p:clrMapOvr>
     <a:masterClrMapping/>
   </p:clrMapOvr>
+  <mc:AlternateContent xmlns:mc="http://schemas.openxmlformats.org/markup-compatibility/2006">
+    <mc:Choice xmlns:p14="http://schemas.microsoft.com/office/powerpoint/2010/main" Requires="p14">
+      <p:transition spd="med" p14:dur="700">
+        <p:fade/>
+      </p:transition>
+    </mc:Choice>
+    <mc:Fallback>
+      <p:transition spd="med">
+        <p:fade/>
+      </p:transition>
+    </mc:Fallback>
+  </mc:AlternateContent>
+  <p:timing>
+    <p:tnLst>
+      <p:par>
+        <p:cTn id="1" dur="indefinite" restart="never" nodeType="tmRoot"/>
+      </p:par>
+    </p:tnLst>
+  </p:timing>
 </p:sld>
 </file>
 
-<file path=ppt/slides/slide12.xml><?xml version="1.0" encoding="utf-8"?>
+<file path=ppt/slides/slide17.xml><?xml version="1.0" encoding="utf-8"?>
 <p:sld xmlns:a="http://schemas.openxmlformats.org/drawingml/2006/main" xmlns:r="http://schemas.openxmlformats.org/officeDocument/2006/relationships" xmlns:p="http://schemas.openxmlformats.org/presentationml/2006/main">
   <p:cSld>
     <p:spTree>
@@ -14240,10 +14933,29 @@
   <p:clrMapOvr>
     <a:masterClrMapping/>
   </p:clrMapOvr>
+  <mc:AlternateContent xmlns:mc="http://schemas.openxmlformats.org/markup-compatibility/2006">
+    <mc:Choice xmlns:p14="http://schemas.microsoft.com/office/powerpoint/2010/main" Requires="p14">
+      <p:transition spd="med" p14:dur="700">
+        <p:fade/>
+      </p:transition>
+    </mc:Choice>
+    <mc:Fallback>
+      <p:transition spd="med">
+        <p:fade/>
+      </p:transition>
+    </mc:Fallback>
+  </mc:AlternateContent>
+  <p:timing>
+    <p:tnLst>
+      <p:par>
+        <p:cTn id="1" dur="indefinite" restart="never" nodeType="tmRoot"/>
+      </p:par>
+    </p:tnLst>
+  </p:timing>
 </p:sld>
 </file>
 
-<file path=ppt/slides/slide13.xml><?xml version="1.0" encoding="utf-8"?>
+<file path=ppt/slides/slide18.xml><?xml version="1.0" encoding="utf-8"?>
 <p:sld xmlns:a="http://schemas.openxmlformats.org/drawingml/2006/main" xmlns:r="http://schemas.openxmlformats.org/officeDocument/2006/relationships" xmlns:p="http://schemas.openxmlformats.org/presentationml/2006/main">
   <p:cSld>
     <p:spTree>
@@ -14346,15 +15058,7 @@
           <a:effectLst>
             <a:reflection blurRad="12700" stA="38000" endPos="28000" dist="5000" dir="5400000" sy="-100000" algn="bl" rotWithShape="0"/>
           </a:effectLst>
-          <a:extLst>
-            <a:ext uri="{909E8E84-426E-40DD-AFC4-6F175D3DCCD1}">
-              <a14:hiddenFill xmlns:a14="http://schemas.microsoft.com/office/drawing/2010/main">
-                <a:solidFill>
-                  <a:srgbClr val="FFFFFF"/>
-                </a:solidFill>
-              </a14:hiddenFill>
-            </a:ext>
-          </a:extLst>
+          <a:extLst/>
         </p:spPr>
       </p:pic>
     </p:spTree>
@@ -14367,10 +15071,29 @@
   <p:clrMapOvr>
     <a:masterClrMapping/>
   </p:clrMapOvr>
+  <mc:AlternateContent xmlns:mc="http://schemas.openxmlformats.org/markup-compatibility/2006">
+    <mc:Choice xmlns:p14="http://schemas.microsoft.com/office/powerpoint/2010/main" Requires="p14">
+      <p:transition spd="med" p14:dur="700">
+        <p:fade/>
+      </p:transition>
+    </mc:Choice>
+    <mc:Fallback>
+      <p:transition spd="med">
+        <p:fade/>
+      </p:transition>
+    </mc:Fallback>
+  </mc:AlternateContent>
+  <p:timing>
+    <p:tnLst>
+      <p:par>
+        <p:cTn id="1" dur="indefinite" restart="never" nodeType="tmRoot"/>
+      </p:par>
+    </p:tnLst>
+  </p:timing>
 </p:sld>
 </file>
 
-<file path=ppt/slides/slide14.xml><?xml version="1.0" encoding="utf-8"?>
+<file path=ppt/slides/slide19.xml><?xml version="1.0" encoding="utf-8"?>
 <p:sld xmlns:a="http://schemas.openxmlformats.org/drawingml/2006/main" xmlns:r="http://schemas.openxmlformats.org/officeDocument/2006/relationships" xmlns:p="http://schemas.openxmlformats.org/presentationml/2006/main">
   <p:cSld>
     <p:spTree>
@@ -14439,10 +15162,177 @@
   <p:clrMapOvr>
     <a:masterClrMapping/>
   </p:clrMapOvr>
+  <mc:AlternateContent xmlns:mc="http://schemas.openxmlformats.org/markup-compatibility/2006">
+    <mc:Choice xmlns:p14="http://schemas.microsoft.com/office/powerpoint/2010/main" Requires="p14">
+      <p:transition spd="med" p14:dur="700">
+        <p:fade/>
+      </p:transition>
+    </mc:Choice>
+    <mc:Fallback>
+      <p:transition spd="med">
+        <p:fade/>
+      </p:transition>
+    </mc:Fallback>
+  </mc:AlternateContent>
 </p:sld>
 </file>
 
-<file path=ppt/slides/slide15.xml><?xml version="1.0" encoding="utf-8"?>
+<file path=ppt/slides/slide2.xml><?xml version="1.0" encoding="utf-8"?>
+<p:sld xmlns:a="http://schemas.openxmlformats.org/drawingml/2006/main" xmlns:r="http://schemas.openxmlformats.org/officeDocument/2006/relationships" xmlns:p="http://schemas.openxmlformats.org/presentationml/2006/main">
+  <p:cSld>
+    <p:spTree>
+      <p:nvGrpSpPr>
+        <p:cNvPr id="1" name=""/>
+        <p:cNvGrpSpPr/>
+        <p:nvPr/>
+      </p:nvGrpSpPr>
+      <p:grpSpPr>
+        <a:xfrm>
+          <a:off x="0" y="0"/>
+          <a:ext cx="0" cy="0"/>
+          <a:chOff x="0" y="0"/>
+          <a:chExt cx="0" cy="0"/>
+        </a:xfrm>
+      </p:grpSpPr>
+      <p:sp>
+        <p:nvSpPr>
+          <p:cNvPr id="2" name="Title 1"/>
+          <p:cNvSpPr>
+            <a:spLocks noGrp="1"/>
+          </p:cNvSpPr>
+          <p:nvPr>
+            <p:ph type="title"/>
+          </p:nvPr>
+        </p:nvSpPr>
+        <p:spPr/>
+        <p:txBody>
+          <a:bodyPr/>
+          <a:lstStyle/>
+          <a:p>
+            <a:r>
+              <a:rPr lang="en-US" dirty="0" smtClean="0"/>
+              <a:t>Who Am I?</a:t>
+            </a:r>
+            <a:endParaRPr lang="en-US" dirty="0"/>
+          </a:p>
+        </p:txBody>
+      </p:sp>
+      <p:sp>
+        <p:nvSpPr>
+          <p:cNvPr id="3" name="Content Placeholder 2"/>
+          <p:cNvSpPr>
+            <a:spLocks noGrp="1"/>
+          </p:cNvSpPr>
+          <p:nvPr>
+            <p:ph idx="1"/>
+          </p:nvPr>
+        </p:nvSpPr>
+        <p:spPr/>
+        <p:txBody>
+          <a:bodyPr/>
+          <a:lstStyle/>
+          <a:p>
+            <a:r>
+              <a:rPr lang="en-US" dirty="0" smtClean="0"/>
+              <a:t>Tim Rayburn – </a:t>
+            </a:r>
+            <a:r>
+              <a:rPr lang="en-US" dirty="0" smtClean="0">
+                <a:hlinkClick r:id="rId2"/>
+              </a:rPr>
+              <a:t>tim@timrayburn.net</a:t>
+            </a:r>
+            <a:endParaRPr lang="en-US" dirty="0" smtClean="0"/>
+          </a:p>
+          <a:p>
+            <a:r>
+              <a:rPr lang="en-US" dirty="0" smtClean="0"/>
+              <a:t>Principal Consultant with Improving Enterprises</a:t>
+            </a:r>
+          </a:p>
+          <a:p>
+            <a:r>
+              <a:rPr lang="en-US" dirty="0" smtClean="0"/>
+              <a:t>Dallas </a:t>
+            </a:r>
+            <a:r>
+              <a:rPr lang="en-US" dirty="0" err="1" smtClean="0"/>
+              <a:t>TechFest</a:t>
+            </a:r>
+            <a:r>
+              <a:rPr lang="en-US" dirty="0"/>
+              <a:t> </a:t>
+            </a:r>
+            <a:r>
+              <a:rPr lang="en-US" dirty="0" smtClean="0"/>
+              <a:t>Organizer</a:t>
+            </a:r>
+          </a:p>
+          <a:p>
+            <a:r>
+              <a:rPr lang="en-US" dirty="0" smtClean="0"/>
+              <a:t>Specialist in all things WCF &amp; BizTalk</a:t>
+            </a:r>
+          </a:p>
+          <a:p>
+            <a:endParaRPr lang="en-US" dirty="0"/>
+          </a:p>
+          <a:p>
+            <a:r>
+              <a:rPr lang="en-US" dirty="0">
+                <a:hlinkClick r:id="rId3"/>
+              </a:rPr>
+              <a:t>http://</a:t>
+            </a:r>
+            <a:r>
+              <a:rPr lang="en-US" dirty="0" smtClean="0">
+                <a:hlinkClick r:id="rId3"/>
+              </a:rPr>
+              <a:t>github.com/trayburn/Presentation-AdvancedTDD</a:t>
+            </a:r>
+            <a:r>
+              <a:rPr lang="en-US" dirty="0" smtClean="0"/>
+              <a:t> </a:t>
+            </a:r>
+          </a:p>
+          <a:p>
+            <a:endParaRPr lang="en-US" dirty="0"/>
+          </a:p>
+        </p:txBody>
+      </p:sp>
+    </p:spTree>
+    <p:extLst>
+      <p:ext uri="{BB962C8B-B14F-4D97-AF65-F5344CB8AC3E}">
+        <p14:creationId xmlns:p14="http://schemas.microsoft.com/office/powerpoint/2010/main" val="2114199264"/>
+      </p:ext>
+    </p:extLst>
+  </p:cSld>
+  <p:clrMapOvr>
+    <a:masterClrMapping/>
+  </p:clrMapOvr>
+  <mc:AlternateContent xmlns:mc="http://schemas.openxmlformats.org/markup-compatibility/2006">
+    <mc:Choice xmlns:p14="http://schemas.microsoft.com/office/powerpoint/2010/main" Requires="p14">
+      <p:transition spd="med" p14:dur="700">
+        <p:fade/>
+      </p:transition>
+    </mc:Choice>
+    <mc:Fallback>
+      <p:transition spd="med">
+        <p:fade/>
+      </p:transition>
+    </mc:Fallback>
+  </mc:AlternateContent>
+  <p:timing>
+    <p:tnLst>
+      <p:par>
+        <p:cTn id="1" dur="indefinite" restart="never" nodeType="tmRoot"/>
+      </p:par>
+    </p:tnLst>
+  </p:timing>
+</p:sld>
+</file>
+
+<file path=ppt/slides/slide20.xml><?xml version="1.0" encoding="utf-8"?>
 <p:sld xmlns:a="http://schemas.openxmlformats.org/drawingml/2006/main" xmlns:r="http://schemas.openxmlformats.org/officeDocument/2006/relationships" xmlns:p="http://schemas.openxmlformats.org/presentationml/2006/main">
   <p:cSld>
     <p:spTree>
@@ -14554,10 +15444,22 @@
   <p:clrMapOvr>
     <a:masterClrMapping/>
   </p:clrMapOvr>
+  <mc:AlternateContent xmlns:mc="http://schemas.openxmlformats.org/markup-compatibility/2006">
+    <mc:Choice xmlns:p14="http://schemas.microsoft.com/office/powerpoint/2010/main" Requires="p14">
+      <p:transition spd="med" p14:dur="700">
+        <p:fade/>
+      </p:transition>
+    </mc:Choice>
+    <mc:Fallback>
+      <p:transition spd="med">
+        <p:fade/>
+      </p:transition>
+    </mc:Fallback>
+  </mc:AlternateContent>
 </p:sld>
 </file>
 
-<file path=ppt/slides/slide16.xml><?xml version="1.0" encoding="utf-8"?>
+<file path=ppt/slides/slide21.xml><?xml version="1.0" encoding="utf-8"?>
 <p:sld xmlns:a="http://schemas.openxmlformats.org/drawingml/2006/main" xmlns:r="http://schemas.openxmlformats.org/officeDocument/2006/relationships" xmlns:p="http://schemas.openxmlformats.org/presentationml/2006/main">
   <p:cSld>
     <p:spTree>
@@ -14630,10 +15532,22 @@
   <p:clrMapOvr>
     <a:masterClrMapping/>
   </p:clrMapOvr>
+  <mc:AlternateContent xmlns:mc="http://schemas.openxmlformats.org/markup-compatibility/2006">
+    <mc:Choice xmlns:p14="http://schemas.microsoft.com/office/powerpoint/2010/main" Requires="p14">
+      <p:transition spd="med" p14:dur="700">
+        <p:fade/>
+      </p:transition>
+    </mc:Choice>
+    <mc:Fallback>
+      <p:transition spd="med">
+        <p:fade/>
+      </p:transition>
+    </mc:Fallback>
+  </mc:AlternateContent>
 </p:sld>
 </file>
 
-<file path=ppt/slides/slide17.xml><?xml version="1.0" encoding="utf-8"?>
+<file path=ppt/slides/slide22.xml><?xml version="1.0" encoding="utf-8"?>
 <p:sld xmlns:a="http://schemas.openxmlformats.org/drawingml/2006/main" xmlns:r="http://schemas.openxmlformats.org/officeDocument/2006/relationships" xmlns:p="http://schemas.openxmlformats.org/presentationml/2006/main">
   <p:cSld>
     <p:spTree>
@@ -14741,142 +15655,6 @@
   <p:clrMapOvr>
     <a:masterClrMapping/>
   </p:clrMapOvr>
-</p:sld>
-</file>
-
-<file path=ppt/slides/slide2.xml><?xml version="1.0" encoding="utf-8"?>
-<p:sld xmlns:a="http://schemas.openxmlformats.org/drawingml/2006/main" xmlns:r="http://schemas.openxmlformats.org/officeDocument/2006/relationships" xmlns:p="http://schemas.openxmlformats.org/presentationml/2006/main">
-  <p:cSld>
-    <p:spTree>
-      <p:nvGrpSpPr>
-        <p:cNvPr id="1" name=""/>
-        <p:cNvGrpSpPr/>
-        <p:nvPr/>
-      </p:nvGrpSpPr>
-      <p:grpSpPr>
-        <a:xfrm>
-          <a:off x="0" y="0"/>
-          <a:ext cx="0" cy="0"/>
-          <a:chOff x="0" y="0"/>
-          <a:chExt cx="0" cy="0"/>
-        </a:xfrm>
-      </p:grpSpPr>
-      <p:sp>
-        <p:nvSpPr>
-          <p:cNvPr id="2" name="Title 1"/>
-          <p:cNvSpPr>
-            <a:spLocks noGrp="1"/>
-          </p:cNvSpPr>
-          <p:nvPr>
-            <p:ph type="title"/>
-          </p:nvPr>
-        </p:nvSpPr>
-        <p:spPr/>
-        <p:txBody>
-          <a:bodyPr/>
-          <a:lstStyle/>
-          <a:p>
-            <a:r>
-              <a:rPr lang="en-US" dirty="0" smtClean="0"/>
-              <a:t>Who Am I?</a:t>
-            </a:r>
-            <a:endParaRPr lang="en-US" dirty="0"/>
-          </a:p>
-        </p:txBody>
-      </p:sp>
-      <p:sp>
-        <p:nvSpPr>
-          <p:cNvPr id="3" name="Content Placeholder 2"/>
-          <p:cNvSpPr>
-            <a:spLocks noGrp="1"/>
-          </p:cNvSpPr>
-          <p:nvPr>
-            <p:ph idx="1"/>
-          </p:nvPr>
-        </p:nvSpPr>
-        <p:spPr/>
-        <p:txBody>
-          <a:bodyPr/>
-          <a:lstStyle/>
-          <a:p>
-            <a:r>
-              <a:rPr lang="en-US" dirty="0" smtClean="0"/>
-              <a:t>Tim Rayburn – </a:t>
-            </a:r>
-            <a:r>
-              <a:rPr lang="en-US" dirty="0" smtClean="0">
-                <a:hlinkClick r:id="rId2"/>
-              </a:rPr>
-              <a:t>tim@timrayburn.net</a:t>
-            </a:r>
-            <a:endParaRPr lang="en-US" dirty="0" smtClean="0"/>
-          </a:p>
-          <a:p>
-            <a:r>
-              <a:rPr lang="en-US" dirty="0" smtClean="0"/>
-              <a:t>Principal Consultant with Improving Enterprises</a:t>
-            </a:r>
-          </a:p>
-          <a:p>
-            <a:r>
-              <a:rPr lang="en-US" dirty="0" smtClean="0"/>
-              <a:t>Dallas </a:t>
-            </a:r>
-            <a:r>
-              <a:rPr lang="en-US" dirty="0" err="1" smtClean="0"/>
-              <a:t>TechFest</a:t>
-            </a:r>
-            <a:r>
-              <a:rPr lang="en-US" dirty="0"/>
-              <a:t> </a:t>
-            </a:r>
-            <a:r>
-              <a:rPr lang="en-US" dirty="0" smtClean="0"/>
-              <a:t>Organizer</a:t>
-            </a:r>
-          </a:p>
-          <a:p>
-            <a:r>
-              <a:rPr lang="en-US" dirty="0" smtClean="0"/>
-              <a:t>Specialist in all things WCF &amp; BizTalk</a:t>
-            </a:r>
-          </a:p>
-          <a:p>
-            <a:endParaRPr lang="en-US" dirty="0"/>
-          </a:p>
-          <a:p>
-            <a:r>
-              <a:rPr lang="en-US" dirty="0">
-                <a:hlinkClick r:id="rId3"/>
-              </a:rPr>
-              <a:t>http://</a:t>
-            </a:r>
-            <a:r>
-              <a:rPr lang="en-US" dirty="0" smtClean="0">
-                <a:hlinkClick r:id="rId3"/>
-              </a:rPr>
-              <a:t>github.com/trayburn/Presentation-AdvancedTDD</a:t>
-            </a:r>
-            <a:r>
-              <a:rPr lang="en-US" dirty="0" smtClean="0"/>
-              <a:t> </a:t>
-            </a:r>
-          </a:p>
-          <a:p>
-            <a:endParaRPr lang="en-US" dirty="0"/>
-          </a:p>
-        </p:txBody>
-      </p:sp>
-    </p:spTree>
-    <p:extLst>
-      <p:ext uri="{BB962C8B-B14F-4D97-AF65-F5344CB8AC3E}">
-        <p14:creationId xmlns:p14="http://schemas.microsoft.com/office/powerpoint/2010/main" val="2114199264"/>
-      </p:ext>
-    </p:extLst>
-  </p:cSld>
-  <p:clrMapOvr>
-    <a:masterClrMapping/>
-  </p:clrMapOvr>
   <mc:AlternateContent xmlns:mc="http://schemas.openxmlformats.org/markup-compatibility/2006">
     <mc:Choice xmlns:p14="http://schemas.microsoft.com/office/powerpoint/2010/main" Requires="p14">
       <p:transition spd="med" p14:dur="700">
@@ -14889,13 +15667,6 @@
       </p:transition>
     </mc:Fallback>
   </mc:AlternateContent>
-  <p:timing>
-    <p:tnLst>
-      <p:par>
-        <p:cTn id="1" dur="indefinite" restart="never" nodeType="tmRoot"/>
-      </p:par>
-    </p:tnLst>
-  </p:timing>
 </p:sld>
 </file>
 
@@ -15835,15 +16606,7 @@
           <a:effectLst>
             <a:reflection blurRad="12700" stA="38000" endPos="28000" dist="5000" dir="5400000" sy="-100000" algn="bl" rotWithShape="0"/>
           </a:effectLst>
-          <a:extLst>
-            <a:ext uri="{909E8E84-426E-40DD-AFC4-6F175D3DCCD1}">
-              <a14:hiddenFill xmlns:a14="http://schemas.microsoft.com/office/drawing/2010/main">
-                <a:solidFill>
-                  <a:srgbClr val="FFFFFF"/>
-                </a:solidFill>
-              </a14:hiddenFill>
-            </a:ext>
-          </a:extLst>
+          <a:extLst/>
         </p:spPr>
       </p:pic>
     </p:spTree>
@@ -15979,6 +16742,18 @@
   <p:clrMapOvr>
     <a:masterClrMapping/>
   </p:clrMapOvr>
+  <mc:AlternateContent xmlns:mc="http://schemas.openxmlformats.org/markup-compatibility/2006">
+    <mc:Choice xmlns:p14="http://schemas.microsoft.com/office/powerpoint/2010/main" Requires="p14">
+      <p:transition spd="med" p14:dur="700">
+        <p:fade/>
+      </p:transition>
+    </mc:Choice>
+    <mc:Fallback>
+      <p:transition spd="med">
+        <p:fade/>
+      </p:transition>
+    </mc:Fallback>
+  </mc:AlternateContent>
 </p:sld>
 </file>
 

</xml_diff>

<commit_message>
Added RhinoMocks to the lib
</commit_message>
<xml_diff>
--- a/Advanced Test Driven Development.pptx
+++ b/Advanced Test Driven Development.pptx
@@ -3583,33 +3583,6 @@
       </p:sp>
       <p:sp>
         <p:nvSpPr>
-          <p:cNvPr id="5" name="Footer Placeholder 4"/>
-          <p:cNvSpPr>
-            <a:spLocks noGrp="1"/>
-          </p:cNvSpPr>
-          <p:nvPr>
-            <p:ph type="ftr" sz="quarter" idx="11"/>
-          </p:nvPr>
-        </p:nvSpPr>
-        <p:spPr>
-          <a:xfrm>
-            <a:off x="4641448" y="5852160"/>
-            <a:ext cx="3502152" cy="365125"/>
-          </a:xfrm>
-          <a:prstGeom prst="rect">
-            <a:avLst/>
-          </a:prstGeom>
-        </p:spPr>
-        <p:txBody>
-          <a:bodyPr/>
-          <a:lstStyle/>
-          <a:p>
-            <a:endParaRPr lang="en-US"/>
-          </a:p>
-        </p:txBody>
-      </p:sp>
-      <p:sp>
-        <p:nvSpPr>
           <p:cNvPr id="6" name="Slide Number Placeholder 5"/>
           <p:cNvSpPr>
             <a:spLocks noGrp="1"/>
@@ -3636,6 +3609,41 @@
               <a:t>‹#›</a:t>
             </a:fld>
             <a:endParaRPr lang="en-US"/>
+          </a:p>
+        </p:txBody>
+      </p:sp>
+      <p:sp>
+        <p:nvSpPr>
+          <p:cNvPr id="7" name="Footer Placeholder 4"/>
+          <p:cNvSpPr>
+            <a:spLocks noGrp="1"/>
+          </p:cNvSpPr>
+          <p:nvPr>
+            <p:ph type="ftr" sz="quarter" idx="11"/>
+          </p:nvPr>
+        </p:nvSpPr>
+        <p:spPr>
+          <a:xfrm>
+            <a:off x="0" y="6645275"/>
+            <a:ext cx="4572000" cy="212725"/>
+          </a:xfrm>
+          <a:prstGeom prst="rect">
+            <a:avLst/>
+          </a:prstGeom>
+        </p:spPr>
+        <p:txBody>
+          <a:bodyPr/>
+          <a:lstStyle>
+            <a:lvl1pPr>
+              <a:defRPr sz="1050"/>
+            </a:lvl1pPr>
+          </a:lstStyle>
+          <a:p>
+            <a:r>
+              <a:rPr lang="en-US" smtClean="0"/>
+              <a:t>http://github.com/trayburn/Presentation-AdvancedTDD</a:t>
+            </a:r>
+            <a:endParaRPr lang="en-US" dirty="0" smtClean="0"/>
           </a:p>
         </p:txBody>
       </p:sp>
@@ -4152,6 +4160,129 @@
               <a:t>Fifth level</a:t>
             </a:r>
             <a:endParaRPr lang="en-US"/>
+          </a:p>
+        </p:txBody>
+      </p:sp>
+      <p:sp>
+        <p:nvSpPr>
+          <p:cNvPr id="8" name="Footer Placeholder 4"/>
+          <p:cNvSpPr txBox="1">
+            <a:spLocks/>
+          </p:cNvSpPr>
+          <p:nvPr userDrawn="1"/>
+        </p:nvSpPr>
+        <p:spPr>
+          <a:xfrm>
+            <a:off x="0" y="6645275"/>
+            <a:ext cx="4572000" cy="212725"/>
+          </a:xfrm>
+          <a:prstGeom prst="rect">
+            <a:avLst/>
+          </a:prstGeom>
+        </p:spPr>
+        <p:txBody>
+          <a:bodyPr/>
+          <a:lstStyle>
+            <a:defPPr>
+              <a:defRPr lang="en-US"/>
+            </a:defPPr>
+            <a:lvl1pPr marL="0" algn="l" defTabSz="914400" rtl="0" eaLnBrk="1" latinLnBrk="0" hangingPunct="1">
+              <a:defRPr sz="1050" kern="1200">
+                <a:solidFill>
+                  <a:schemeClr val="tx1"/>
+                </a:solidFill>
+                <a:latin typeface="+mn-lt"/>
+                <a:ea typeface="+mn-ea"/>
+                <a:cs typeface="+mn-cs"/>
+              </a:defRPr>
+            </a:lvl1pPr>
+            <a:lvl2pPr marL="457200" algn="l" defTabSz="914400" rtl="0" eaLnBrk="1" latinLnBrk="0" hangingPunct="1">
+              <a:defRPr sz="1800" kern="1200">
+                <a:solidFill>
+                  <a:schemeClr val="tx1"/>
+                </a:solidFill>
+                <a:latin typeface="+mn-lt"/>
+                <a:ea typeface="+mn-ea"/>
+                <a:cs typeface="+mn-cs"/>
+              </a:defRPr>
+            </a:lvl2pPr>
+            <a:lvl3pPr marL="914400" algn="l" defTabSz="914400" rtl="0" eaLnBrk="1" latinLnBrk="0" hangingPunct="1">
+              <a:defRPr sz="1800" kern="1200">
+                <a:solidFill>
+                  <a:schemeClr val="tx1"/>
+                </a:solidFill>
+                <a:latin typeface="+mn-lt"/>
+                <a:ea typeface="+mn-ea"/>
+                <a:cs typeface="+mn-cs"/>
+              </a:defRPr>
+            </a:lvl3pPr>
+            <a:lvl4pPr marL="1371600" algn="l" defTabSz="914400" rtl="0" eaLnBrk="1" latinLnBrk="0" hangingPunct="1">
+              <a:defRPr sz="1800" kern="1200">
+                <a:solidFill>
+                  <a:schemeClr val="tx1"/>
+                </a:solidFill>
+                <a:latin typeface="+mn-lt"/>
+                <a:ea typeface="+mn-ea"/>
+                <a:cs typeface="+mn-cs"/>
+              </a:defRPr>
+            </a:lvl4pPr>
+            <a:lvl5pPr marL="1828800" algn="l" defTabSz="914400" rtl="0" eaLnBrk="1" latinLnBrk="0" hangingPunct="1">
+              <a:defRPr sz="1800" kern="1200">
+                <a:solidFill>
+                  <a:schemeClr val="tx1"/>
+                </a:solidFill>
+                <a:latin typeface="+mn-lt"/>
+                <a:ea typeface="+mn-ea"/>
+                <a:cs typeface="+mn-cs"/>
+              </a:defRPr>
+            </a:lvl5pPr>
+            <a:lvl6pPr marL="2286000" algn="l" defTabSz="914400" rtl="0" eaLnBrk="1" latinLnBrk="0" hangingPunct="1">
+              <a:defRPr sz="1800" kern="1200">
+                <a:solidFill>
+                  <a:schemeClr val="tx1"/>
+                </a:solidFill>
+                <a:latin typeface="+mn-lt"/>
+                <a:ea typeface="+mn-ea"/>
+                <a:cs typeface="+mn-cs"/>
+              </a:defRPr>
+            </a:lvl6pPr>
+            <a:lvl7pPr marL="2743200" algn="l" defTabSz="914400" rtl="0" eaLnBrk="1" latinLnBrk="0" hangingPunct="1">
+              <a:defRPr sz="1800" kern="1200">
+                <a:solidFill>
+                  <a:schemeClr val="tx1"/>
+                </a:solidFill>
+                <a:latin typeface="+mn-lt"/>
+                <a:ea typeface="+mn-ea"/>
+                <a:cs typeface="+mn-cs"/>
+              </a:defRPr>
+            </a:lvl7pPr>
+            <a:lvl8pPr marL="3200400" algn="l" defTabSz="914400" rtl="0" eaLnBrk="1" latinLnBrk="0" hangingPunct="1">
+              <a:defRPr sz="1800" kern="1200">
+                <a:solidFill>
+                  <a:schemeClr val="tx1"/>
+                </a:solidFill>
+                <a:latin typeface="+mn-lt"/>
+                <a:ea typeface="+mn-ea"/>
+                <a:cs typeface="+mn-cs"/>
+              </a:defRPr>
+            </a:lvl8pPr>
+            <a:lvl9pPr marL="3657600" algn="l" defTabSz="914400" rtl="0" eaLnBrk="1" latinLnBrk="0" hangingPunct="1">
+              <a:defRPr sz="1800" kern="1200">
+                <a:solidFill>
+                  <a:schemeClr val="tx1"/>
+                </a:solidFill>
+                <a:latin typeface="+mn-lt"/>
+                <a:ea typeface="+mn-ea"/>
+                <a:cs typeface="+mn-cs"/>
+              </a:defRPr>
+            </a:lvl9pPr>
+          </a:lstStyle>
+          <a:p>
+            <a:r>
+              <a:rPr lang="en-US" smtClean="0"/>
+              <a:t>http://github.com/trayburn/Presentation-AdvancedTDD</a:t>
+            </a:r>
+            <a:endParaRPr lang="en-US" dirty="0" smtClean="0"/>
           </a:p>
         </p:txBody>
       </p:sp>
@@ -13527,6 +13658,41 @@
           </a:prstGeom>
         </p:spPr>
       </p:pic>
+      <p:sp>
+        <p:nvSpPr>
+          <p:cNvPr id="48" name="Footer Placeholder 4"/>
+          <p:cNvSpPr>
+            <a:spLocks noGrp="1"/>
+          </p:cNvSpPr>
+          <p:nvPr>
+            <p:ph type="ftr" sz="quarter" idx="3"/>
+          </p:nvPr>
+        </p:nvSpPr>
+        <p:spPr>
+          <a:xfrm>
+            <a:off x="0" y="6645275"/>
+            <a:ext cx="4572000" cy="212725"/>
+          </a:xfrm>
+          <a:prstGeom prst="rect">
+            <a:avLst/>
+          </a:prstGeom>
+        </p:spPr>
+        <p:txBody>
+          <a:bodyPr/>
+          <a:lstStyle>
+            <a:lvl1pPr>
+              <a:defRPr sz="1050"/>
+            </a:lvl1pPr>
+          </a:lstStyle>
+          <a:p>
+            <a:r>
+              <a:rPr lang="en-US" smtClean="0"/>
+              <a:t>http://github.com/trayburn/Presentation-AdvancedTDD</a:t>
+            </a:r>
+            <a:endParaRPr lang="en-US" dirty="0" smtClean="0"/>
+          </a:p>
+        </p:txBody>
+      </p:sp>
     </p:spTree>
   </p:cSld>
   <p:clrMap bg1="lt1" tx1="dk1" bg2="lt2" tx2="dk2" accent1="accent1" accent2="accent2" accent3="accent3" accent4="accent4" accent5="accent5" accent6="accent6" hlink="hlink" folHlink="folHlink"/>
@@ -13963,13 +14129,13 @@
   <p:clrMapOvr>
     <a:masterClrMapping/>
   </p:clrMapOvr>
-  <mc:AlternateContent xmlns:mc="http://schemas.openxmlformats.org/markup-compatibility/2006">
-    <mc:Choice xmlns:p14="http://schemas.microsoft.com/office/powerpoint/2010/main" Requires="p14">
+  <mc:AlternateContent xmlns:mc="http://schemas.openxmlformats.org/markup-compatibility/2006" xmlns:p14="http://schemas.microsoft.com/office/powerpoint/2010/main">
+    <mc:Choice Requires="p14">
       <p:transition spd="med" p14:dur="700">
         <p:fade/>
       </p:transition>
     </mc:Choice>
-    <mc:Fallback>
+    <mc:Fallback xmlns="">
       <p:transition spd="med">
         <p:fade/>
       </p:transition>
@@ -14058,13 +14224,13 @@
   <p:clrMapOvr>
     <a:masterClrMapping/>
   </p:clrMapOvr>
-  <mc:AlternateContent xmlns:mc="http://schemas.openxmlformats.org/markup-compatibility/2006">
-    <mc:Choice xmlns:p14="http://schemas.microsoft.com/office/powerpoint/2010/main" Requires="p14">
+  <mc:AlternateContent xmlns:mc="http://schemas.openxmlformats.org/markup-compatibility/2006" xmlns:p14="http://schemas.microsoft.com/office/powerpoint/2010/main">
+    <mc:Choice Requires="p14">
       <p:transition spd="med" p14:dur="700">
         <p:fade/>
       </p:transition>
     </mc:Choice>
-    <mc:Fallback>
+    <mc:Fallback xmlns="">
       <p:transition spd="med">
         <p:fade/>
       </p:transition>
@@ -14132,13 +14298,13 @@
   <p:clrMapOvr>
     <a:masterClrMapping/>
   </p:clrMapOvr>
-  <mc:AlternateContent xmlns:mc="http://schemas.openxmlformats.org/markup-compatibility/2006">
-    <mc:Choice xmlns:p14="http://schemas.microsoft.com/office/powerpoint/2010/main" Requires="p14">
+  <mc:AlternateContent xmlns:mc="http://schemas.openxmlformats.org/markup-compatibility/2006" xmlns:p14="http://schemas.microsoft.com/office/powerpoint/2010/main">
+    <mc:Choice Requires="p14">
       <p:transition spd="med" p14:dur="700">
         <p:fade/>
       </p:transition>
     </mc:Choice>
-    <mc:Fallback>
+    <mc:Fallback xmlns="">
       <p:transition spd="med">
         <p:fade/>
       </p:transition>
@@ -14236,13 +14402,13 @@
   <p:clrMapOvr>
     <a:masterClrMapping/>
   </p:clrMapOvr>
-  <mc:AlternateContent xmlns:mc="http://schemas.openxmlformats.org/markup-compatibility/2006">
-    <mc:Choice xmlns:p14="http://schemas.microsoft.com/office/powerpoint/2010/main" Requires="p14">
+  <mc:AlternateContent xmlns:mc="http://schemas.openxmlformats.org/markup-compatibility/2006" xmlns:p14="http://schemas.microsoft.com/office/powerpoint/2010/main">
+    <mc:Choice Requires="p14">
       <p:transition spd="med" p14:dur="700">
         <p:fade/>
       </p:transition>
     </mc:Choice>
-    <mc:Fallback>
+    <mc:Fallback xmlns="">
       <p:transition spd="med">
         <p:fade/>
       </p:transition>
@@ -14440,13 +14606,13 @@
   <p:clrMapOvr>
     <a:masterClrMapping/>
   </p:clrMapOvr>
-  <mc:AlternateContent xmlns:mc="http://schemas.openxmlformats.org/markup-compatibility/2006">
-    <mc:Choice xmlns:p14="http://schemas.microsoft.com/office/powerpoint/2010/main" Requires="p14">
+  <mc:AlternateContent xmlns:mc="http://schemas.openxmlformats.org/markup-compatibility/2006" xmlns:p14="http://schemas.microsoft.com/office/powerpoint/2010/main">
+    <mc:Choice Requires="p14">
       <p:transition spd="med" p14:dur="700">
         <p:fade/>
       </p:transition>
     </mc:Choice>
-    <mc:Fallback>
+    <mc:Fallback xmlns="">
       <p:transition spd="med">
         <p:fade/>
       </p:transition>
@@ -14574,13 +14740,13 @@
   <p:clrMapOvr>
     <a:masterClrMapping/>
   </p:clrMapOvr>
-  <mc:AlternateContent xmlns:mc="http://schemas.openxmlformats.org/markup-compatibility/2006">
-    <mc:Choice xmlns:p14="http://schemas.microsoft.com/office/powerpoint/2010/main" Requires="p14">
+  <mc:AlternateContent xmlns:mc="http://schemas.openxmlformats.org/markup-compatibility/2006" xmlns:p14="http://schemas.microsoft.com/office/powerpoint/2010/main">
+    <mc:Choice Requires="p14">
       <p:transition spd="med" p14:dur="700">
         <p:fade/>
       </p:transition>
     </mc:Choice>
-    <mc:Fallback>
+    <mc:Fallback xmlns="">
       <p:transition spd="med">
         <p:fade/>
       </p:transition>
@@ -14708,13 +14874,13 @@
   <p:clrMapOvr>
     <a:masterClrMapping/>
   </p:clrMapOvr>
-  <mc:AlternateContent xmlns:mc="http://schemas.openxmlformats.org/markup-compatibility/2006">
-    <mc:Choice xmlns:p14="http://schemas.microsoft.com/office/powerpoint/2010/main" Requires="p14">
+  <mc:AlternateContent xmlns:mc="http://schemas.openxmlformats.org/markup-compatibility/2006" xmlns:p14="http://schemas.microsoft.com/office/powerpoint/2010/main">
+    <mc:Choice Requires="p14">
       <p:transition spd="med" p14:dur="700">
         <p:fade/>
       </p:transition>
     </mc:Choice>
-    <mc:Fallback>
+    <mc:Fallback xmlns="">
       <p:transition spd="med">
         <p:fade/>
       </p:transition>
@@ -14785,7 +14951,7 @@
           <a:bodyPr/>
           <a:lstStyle/>
           <a:p>
-            <a:endParaRPr lang="en-US"/>
+            <a:endParaRPr lang="en-US" dirty="0"/>
           </a:p>
         </p:txBody>
       </p:sp>
@@ -14842,13 +15008,13 @@
   <p:clrMapOvr>
     <a:masterClrMapping/>
   </p:clrMapOvr>
-  <mc:AlternateContent xmlns:mc="http://schemas.openxmlformats.org/markup-compatibility/2006">
-    <mc:Choice xmlns:p14="http://schemas.microsoft.com/office/powerpoint/2010/main" Requires="p14">
+  <mc:AlternateContent xmlns:mc="http://schemas.openxmlformats.org/markup-compatibility/2006" xmlns:p14="http://schemas.microsoft.com/office/powerpoint/2010/main">
+    <mc:Choice Requires="p14">
       <p:transition spd="med" p14:dur="700">
         <p:fade/>
       </p:transition>
     </mc:Choice>
-    <mc:Fallback>
+    <mc:Fallback xmlns="">
       <p:transition spd="med">
         <p:fade/>
       </p:transition>
@@ -14933,13 +15099,13 @@
   <p:clrMapOvr>
     <a:masterClrMapping/>
   </p:clrMapOvr>
-  <mc:AlternateContent xmlns:mc="http://schemas.openxmlformats.org/markup-compatibility/2006">
-    <mc:Choice xmlns:p14="http://schemas.microsoft.com/office/powerpoint/2010/main" Requires="p14">
+  <mc:AlternateContent xmlns:mc="http://schemas.openxmlformats.org/markup-compatibility/2006" xmlns:p14="http://schemas.microsoft.com/office/powerpoint/2010/main">
+    <mc:Choice Requires="p14">
       <p:transition spd="med" p14:dur="700">
         <p:fade/>
       </p:transition>
     </mc:Choice>
-    <mc:Fallback>
+    <mc:Fallback xmlns="">
       <p:transition spd="med">
         <p:fade/>
       </p:transition>
@@ -15071,13 +15237,13 @@
   <p:clrMapOvr>
     <a:masterClrMapping/>
   </p:clrMapOvr>
-  <mc:AlternateContent xmlns:mc="http://schemas.openxmlformats.org/markup-compatibility/2006">
-    <mc:Choice xmlns:p14="http://schemas.microsoft.com/office/powerpoint/2010/main" Requires="p14">
+  <mc:AlternateContent xmlns:mc="http://schemas.openxmlformats.org/markup-compatibility/2006" xmlns:p14="http://schemas.microsoft.com/office/powerpoint/2010/main">
+    <mc:Choice Requires="p14">
       <p:transition spd="med" p14:dur="700">
         <p:fade/>
       </p:transition>
     </mc:Choice>
-    <mc:Fallback>
+    <mc:Fallback xmlns="">
       <p:transition spd="med">
         <p:fade/>
       </p:transition>
@@ -15162,13 +15328,13 @@
   <p:clrMapOvr>
     <a:masterClrMapping/>
   </p:clrMapOvr>
-  <mc:AlternateContent xmlns:mc="http://schemas.openxmlformats.org/markup-compatibility/2006">
-    <mc:Choice xmlns:p14="http://schemas.microsoft.com/office/powerpoint/2010/main" Requires="p14">
+  <mc:AlternateContent xmlns:mc="http://schemas.openxmlformats.org/markup-compatibility/2006" xmlns:p14="http://schemas.microsoft.com/office/powerpoint/2010/main">
+    <mc:Choice Requires="p14">
       <p:transition spd="med" p14:dur="700">
         <p:fade/>
       </p:transition>
     </mc:Choice>
-    <mc:Fallback>
+    <mc:Fallback xmlns="">
       <p:transition spd="med">
         <p:fade/>
       </p:transition>
@@ -15253,20 +15419,13 @@
           <a:p>
             <a:r>
               <a:rPr lang="en-US" dirty="0" smtClean="0"/>
-              <a:t>Dallas </a:t>
+              <a:t>President of Dallas </a:t>
             </a:r>
             <a:r>
               <a:rPr lang="en-US" dirty="0" err="1" smtClean="0"/>
               <a:t>TechFest</a:t>
             </a:r>
-            <a:r>
-              <a:rPr lang="en-US" dirty="0"/>
-              <a:t> </a:t>
-            </a:r>
-            <a:r>
-              <a:rPr lang="en-US" dirty="0" smtClean="0"/>
-              <a:t>Organizer</a:t>
-            </a:r>
+            <a:endParaRPr lang="en-US" dirty="0" smtClean="0"/>
           </a:p>
           <a:p>
             <a:r>
@@ -15310,13 +15469,13 @@
   <p:clrMapOvr>
     <a:masterClrMapping/>
   </p:clrMapOvr>
-  <mc:AlternateContent xmlns:mc="http://schemas.openxmlformats.org/markup-compatibility/2006">
-    <mc:Choice xmlns:p14="http://schemas.microsoft.com/office/powerpoint/2010/main" Requires="p14">
+  <mc:AlternateContent xmlns:mc="http://schemas.openxmlformats.org/markup-compatibility/2006" xmlns:p14="http://schemas.microsoft.com/office/powerpoint/2010/main">
+    <mc:Choice Requires="p14">
       <p:transition spd="med" p14:dur="700">
         <p:fade/>
       </p:transition>
     </mc:Choice>
-    <mc:Fallback>
+    <mc:Fallback xmlns="">
       <p:transition spd="med">
         <p:fade/>
       </p:transition>
@@ -15444,13 +15603,13 @@
   <p:clrMapOvr>
     <a:masterClrMapping/>
   </p:clrMapOvr>
-  <mc:AlternateContent xmlns:mc="http://schemas.openxmlformats.org/markup-compatibility/2006">
-    <mc:Choice xmlns:p14="http://schemas.microsoft.com/office/powerpoint/2010/main" Requires="p14">
+  <mc:AlternateContent xmlns:mc="http://schemas.openxmlformats.org/markup-compatibility/2006" xmlns:p14="http://schemas.microsoft.com/office/powerpoint/2010/main">
+    <mc:Choice Requires="p14">
       <p:transition spd="med" p14:dur="700">
         <p:fade/>
       </p:transition>
     </mc:Choice>
-    <mc:Fallback>
+    <mc:Fallback xmlns="">
       <p:transition spd="med">
         <p:fade/>
       </p:transition>
@@ -15532,13 +15691,13 @@
   <p:clrMapOvr>
     <a:masterClrMapping/>
   </p:clrMapOvr>
-  <mc:AlternateContent xmlns:mc="http://schemas.openxmlformats.org/markup-compatibility/2006">
-    <mc:Choice xmlns:p14="http://schemas.microsoft.com/office/powerpoint/2010/main" Requires="p14">
+  <mc:AlternateContent xmlns:mc="http://schemas.openxmlformats.org/markup-compatibility/2006" xmlns:p14="http://schemas.microsoft.com/office/powerpoint/2010/main">
+    <mc:Choice Requires="p14">
       <p:transition spd="med" p14:dur="700">
         <p:fade/>
       </p:transition>
     </mc:Choice>
-    <mc:Fallback>
+    <mc:Fallback xmlns="">
       <p:transition spd="med">
         <p:fade/>
       </p:transition>
@@ -15655,13 +15814,13 @@
   <p:clrMapOvr>
     <a:masterClrMapping/>
   </p:clrMapOvr>
-  <mc:AlternateContent xmlns:mc="http://schemas.openxmlformats.org/markup-compatibility/2006">
-    <mc:Choice xmlns:p14="http://schemas.microsoft.com/office/powerpoint/2010/main" Requires="p14">
+  <mc:AlternateContent xmlns:mc="http://schemas.openxmlformats.org/markup-compatibility/2006" xmlns:p14="http://schemas.microsoft.com/office/powerpoint/2010/main">
+    <mc:Choice Requires="p14">
       <p:transition spd="med" p14:dur="700">
         <p:fade/>
       </p:transition>
     </mc:Choice>
-    <mc:Fallback>
+    <mc:Fallback xmlns="">
       <p:transition spd="med">
         <p:fade/>
       </p:transition>
@@ -15751,13 +15910,13 @@
   <p:clrMapOvr>
     <a:masterClrMapping/>
   </p:clrMapOvr>
-  <mc:AlternateContent xmlns:mc="http://schemas.openxmlformats.org/markup-compatibility/2006">
-    <mc:Choice xmlns:p14="http://schemas.microsoft.com/office/powerpoint/2010/main" Requires="p14">
+  <mc:AlternateContent xmlns:mc="http://schemas.openxmlformats.org/markup-compatibility/2006" xmlns:p14="http://schemas.microsoft.com/office/powerpoint/2010/main">
+    <mc:Choice Requires="p14">
       <p:transition spd="med" p14:dur="700">
         <p:fade/>
       </p:transition>
     </mc:Choice>
-    <mc:Fallback>
+    <mc:Fallback xmlns="">
       <p:transition spd="med">
         <p:fade/>
       </p:transition>
@@ -15878,13 +16037,13 @@
   <p:clrMapOvr>
     <a:masterClrMapping/>
   </p:clrMapOvr>
-  <mc:AlternateContent xmlns:mc="http://schemas.openxmlformats.org/markup-compatibility/2006">
-    <mc:Choice xmlns:p14="http://schemas.microsoft.com/office/powerpoint/2010/main" Requires="p14">
+  <mc:AlternateContent xmlns:mc="http://schemas.openxmlformats.org/markup-compatibility/2006" xmlns:p14="http://schemas.microsoft.com/office/powerpoint/2010/main">
+    <mc:Choice Requires="p14">
       <p:transition spd="med" p14:dur="700">
         <p:fade/>
       </p:transition>
     </mc:Choice>
-    <mc:Fallback>
+    <mc:Fallback xmlns="">
       <p:transition spd="med">
         <p:fade/>
       </p:transition>
@@ -15969,13 +16128,13 @@
   <p:clrMapOvr>
     <a:masterClrMapping/>
   </p:clrMapOvr>
-  <mc:AlternateContent xmlns:mc="http://schemas.openxmlformats.org/markup-compatibility/2006">
-    <mc:Choice xmlns:p14="http://schemas.microsoft.com/office/powerpoint/2010/main" Requires="p14">
+  <mc:AlternateContent xmlns:mc="http://schemas.openxmlformats.org/markup-compatibility/2006" xmlns:p14="http://schemas.microsoft.com/office/powerpoint/2010/main">
+    <mc:Choice Requires="p14">
       <p:transition spd="med" p14:dur="700">
         <p:fade/>
       </p:transition>
     </mc:Choice>
-    <mc:Fallback>
+    <mc:Fallback xmlns="">
       <p:transition spd="med">
         <p:fade/>
       </p:transition>
@@ -16219,13 +16378,13 @@
   <p:clrMapOvr>
     <a:masterClrMapping/>
   </p:clrMapOvr>
-  <mc:AlternateContent xmlns:mc="http://schemas.openxmlformats.org/markup-compatibility/2006">
-    <mc:Choice xmlns:p14="http://schemas.microsoft.com/office/powerpoint/2010/main" Requires="p14">
+  <mc:AlternateContent xmlns:mc="http://schemas.openxmlformats.org/markup-compatibility/2006" xmlns:p14="http://schemas.microsoft.com/office/powerpoint/2010/main">
+    <mc:Choice Requires="p14">
       <p:transition spd="med" p14:dur="700">
         <p:fade/>
       </p:transition>
     </mc:Choice>
-    <mc:Fallback>
+    <mc:Fallback xmlns="">
       <p:transition spd="med">
         <p:fade/>
       </p:transition>
@@ -16469,13 +16628,13 @@
   <p:clrMapOvr>
     <a:masterClrMapping/>
   </p:clrMapOvr>
-  <mc:AlternateContent xmlns:mc="http://schemas.openxmlformats.org/markup-compatibility/2006">
-    <mc:Choice xmlns:p14="http://schemas.microsoft.com/office/powerpoint/2010/main" Requires="p14">
+  <mc:AlternateContent xmlns:mc="http://schemas.openxmlformats.org/markup-compatibility/2006" xmlns:p14="http://schemas.microsoft.com/office/powerpoint/2010/main">
+    <mc:Choice Requires="p14">
       <p:transition spd="med" p14:dur="700">
         <p:fade/>
       </p:transition>
     </mc:Choice>
-    <mc:Fallback>
+    <mc:Fallback xmlns="">
       <p:transition spd="med">
         <p:fade/>
       </p:transition>
@@ -16619,13 +16778,13 @@
   <p:clrMapOvr>
     <a:masterClrMapping/>
   </p:clrMapOvr>
-  <mc:AlternateContent xmlns:mc="http://schemas.openxmlformats.org/markup-compatibility/2006">
-    <mc:Choice xmlns:p14="http://schemas.microsoft.com/office/powerpoint/2010/main" Requires="p14">
+  <mc:AlternateContent xmlns:mc="http://schemas.openxmlformats.org/markup-compatibility/2006" xmlns:p14="http://schemas.microsoft.com/office/powerpoint/2010/main">
+    <mc:Choice Requires="p14">
       <p:transition spd="med" p14:dur="700">
         <p:fade/>
       </p:transition>
     </mc:Choice>
-    <mc:Fallback>
+    <mc:Fallback xmlns="">
       <p:transition spd="med">
         <p:fade/>
       </p:transition>
@@ -16742,13 +16901,13 @@
   <p:clrMapOvr>
     <a:masterClrMapping/>
   </p:clrMapOvr>
-  <mc:AlternateContent xmlns:mc="http://schemas.openxmlformats.org/markup-compatibility/2006">
-    <mc:Choice xmlns:p14="http://schemas.microsoft.com/office/powerpoint/2010/main" Requires="p14">
+  <mc:AlternateContent xmlns:mc="http://schemas.openxmlformats.org/markup-compatibility/2006" xmlns:p14="http://schemas.microsoft.com/office/powerpoint/2010/main">
+    <mc:Choice Requires="p14">
       <p:transition spd="med" p14:dur="700">
         <p:fade/>
       </p:transition>
     </mc:Choice>
-    <mc:Fallback>
+    <mc:Fallback xmlns="">
       <p:transition spd="med">
         <p:fade/>
       </p:transition>

</xml_diff>